<commit_message>
Use this one pls
</commit_message>
<xml_diff>
--- a/Pitch/Pitch_2020 - Jayden.pptx
+++ b/Pitch/Pitch_2020 - Jayden.pptx
@@ -4192,7 +4192,7 @@
         </p:blipFill>
         <p:spPr>
           <a:xfrm>
-            <a:off x="0" y="-46132"/>
+            <a:off x="0" y="-68581"/>
             <a:ext cx="12435844" cy="6995161"/>
           </a:xfrm>
           <a:prstGeom prst="rect">
@@ -4253,8 +4253,8 @@
         </p:nvSpPr>
         <p:spPr>
           <a:xfrm>
-            <a:off x="219456" y="1304544"/>
-            <a:ext cx="11277600" cy="4832092"/>
+            <a:off x="256032" y="864327"/>
+            <a:ext cx="11277600" cy="5663089"/>
           </a:xfrm>
           <a:prstGeom prst="rect">
             <a:avLst/>
@@ -4285,7 +4285,39 @@
                   <a:schemeClr val="bg1"/>
                 </a:solidFill>
               </a:rPr>
-              <a:t>274.5 million dollars</a:t>
+              <a:t>300 million dollars</a:t>
+            </a:r>
+          </a:p>
+          <a:p>
+            <a:endParaRPr lang="en-CA" dirty="0">
+              <a:solidFill>
+                <a:schemeClr val="bg1"/>
+              </a:solidFill>
+            </a:endParaRPr>
+          </a:p>
+          <a:p>
+            <a:pPr marL="285750" indent="-285750">
+              <a:buFont typeface="Courier New" panose="02070309020205020404" pitchFamily="49" charset="0"/>
+              <a:buChar char="o"/>
+            </a:pPr>
+            <a:endParaRPr lang="en-CA" dirty="0">
+              <a:solidFill>
+                <a:schemeClr val="bg1"/>
+              </a:solidFill>
+            </a:endParaRPr>
+          </a:p>
+          <a:p>
+            <a:pPr marL="285750" indent="-285750">
+              <a:buFont typeface="Courier New" panose="02070309020205020404" pitchFamily="49" charset="0"/>
+              <a:buChar char="o"/>
+            </a:pPr>
+            <a:r>
+              <a:rPr lang="en-CA" dirty="0">
+                <a:solidFill>
+                  <a:schemeClr val="bg1"/>
+                </a:solidFill>
+              </a:rPr>
+              <a:t>This year sales                                                                                  274.5 million dollars</a:t>
             </a:r>
             <a:endParaRPr lang="en-US" dirty="0">
               <a:solidFill>
@@ -4487,7 +4519,7 @@
         </p:nvSpPr>
         <p:spPr>
           <a:xfrm>
-            <a:off x="4120896" y="1304544"/>
+            <a:off x="4102608" y="953166"/>
             <a:ext cx="1475232" cy="362585"/>
           </a:xfrm>
           <a:prstGeom prst="rightArrow">
@@ -4536,7 +4568,7 @@
         </p:nvSpPr>
         <p:spPr>
           <a:xfrm>
-            <a:off x="4120896" y="2426588"/>
+            <a:off x="4072128" y="2772471"/>
             <a:ext cx="1475232" cy="362585"/>
           </a:xfrm>
           <a:prstGeom prst="rightArrow">
@@ -4585,7 +4617,7 @@
         </p:nvSpPr>
         <p:spPr>
           <a:xfrm>
-            <a:off x="4120896" y="3422998"/>
+            <a:off x="4102608" y="3826827"/>
             <a:ext cx="1475232" cy="362585"/>
           </a:xfrm>
           <a:prstGeom prst="rightArrow">
@@ -4634,7 +4666,7 @@
         </p:nvSpPr>
         <p:spPr>
           <a:xfrm>
-            <a:off x="4120896" y="4507356"/>
+            <a:off x="4072128" y="4979350"/>
             <a:ext cx="1475232" cy="397734"/>
           </a:xfrm>
           <a:prstGeom prst="rightArrow">
@@ -4683,7 +4715,56 @@
         </p:nvSpPr>
         <p:spPr>
           <a:xfrm>
-            <a:off x="4120896" y="5774051"/>
+            <a:off x="4072128" y="6113584"/>
+            <a:ext cx="1475232" cy="362585"/>
+          </a:xfrm>
+          <a:prstGeom prst="rightArrow">
+            <a:avLst/>
+          </a:prstGeom>
+          <a:solidFill>
+            <a:schemeClr val="bg1"/>
+          </a:solidFill>
+        </p:spPr>
+        <p:style>
+          <a:lnRef idx="2">
+            <a:schemeClr val="accent1">
+              <a:shade val="50000"/>
+            </a:schemeClr>
+          </a:lnRef>
+          <a:fillRef idx="1">
+            <a:schemeClr val="accent1"/>
+          </a:fillRef>
+          <a:effectRef idx="0">
+            <a:schemeClr val="accent1"/>
+          </a:effectRef>
+          <a:fontRef idx="minor">
+            <a:schemeClr val="lt1"/>
+          </a:fontRef>
+        </p:style>
+        <p:txBody>
+          <a:bodyPr rtlCol="0" anchor="ctr"/>
+          <a:lstStyle/>
+          <a:p>
+            <a:pPr algn="ctr"/>
+            <a:endParaRPr lang="en-US"/>
+          </a:p>
+        </p:txBody>
+      </p:sp>
+      <p:sp>
+        <p:nvSpPr>
+          <p:cNvPr id="13" name="Right Arrow 12">
+            <a:extLst>
+              <a:ext uri="{FF2B5EF4-FFF2-40B4-BE49-F238E27FC236}">
+                <a16:creationId xmlns:a16="http://schemas.microsoft.com/office/drawing/2014/main" id="{4E7E6981-6DFB-634C-AC55-F21A0AD5D3A7}"/>
+              </a:ext>
+            </a:extLst>
+          </p:cNvPr>
+          <p:cNvSpPr/>
+          <p:nvPr/>
+        </p:nvSpPr>
+        <p:spPr>
+          <a:xfrm>
+            <a:off x="4102608" y="1644332"/>
             <a:ext cx="1475232" cy="362585"/>
           </a:xfrm>
           <a:prstGeom prst="rightArrow">

</xml_diff>